<commit_message>
chore: final tweaks to presentation
</commit_message>
<xml_diff>
--- a/presentation.pptx
+++ b/presentation.pptx
@@ -27716,6 +27716,15 @@
           <a:p>
             <a:r>
               <a:rPr lang="en-GB" dirty="0"/>
+              <a:t>Create an application that learns to generate new lyrics based on existing lyrics</a:t>
+            </a:r>
+          </a:p>
+          <a:p>
+            <a:endParaRPr lang="en-GB" dirty="0"/>
+          </a:p>
+          <a:p>
+            <a:r>
+              <a:rPr lang="en-GB" dirty="0"/>
               <a:t>Idea for a Gofore </a:t>
             </a:r>
             <a:r>
@@ -28115,18 +28124,6 @@
           <a:lstStyle/>
           <a:p>
             <a:r>
-              <a:rPr lang="fi-FI" dirty="0">
-                <a:hlinkClick r:id="rId3"/>
-              </a:rPr>
-              <a:t>https://github.com/antsim/sausage-ai</a:t>
-            </a:r>
-            <a:endParaRPr lang="fi-FI" dirty="0"/>
-          </a:p>
-          <a:p>
-            <a:endParaRPr lang="fi-FI" dirty="0"/>
-          </a:p>
-          <a:p>
-            <a:r>
               <a:rPr lang="fi-FI" dirty="0" err="1"/>
               <a:t>Load</a:t>
             </a:r>
@@ -28291,6 +28288,57 @@
             <a:r>
               <a:rPr lang="fi-FI" dirty="0"/>
               <a:t>Train </a:t>
+            </a:r>
+            <a:r>
+              <a:rPr lang="fi-FI" dirty="0" err="1"/>
+              <a:t>model</a:t>
+            </a:r>
+            <a:endParaRPr lang="fi-FI" dirty="0"/>
+          </a:p>
+          <a:p>
+            <a:r>
+              <a:rPr lang="fi-FI" dirty="0"/>
+              <a:t>Output </a:t>
+            </a:r>
+            <a:r>
+              <a:rPr lang="fi-FI" dirty="0" err="1"/>
+              <a:t>characters</a:t>
+            </a:r>
+            <a:r>
+              <a:rPr lang="fi-FI" dirty="0"/>
+              <a:t> </a:t>
+            </a:r>
+            <a:r>
+              <a:rPr lang="fi-FI" dirty="0" err="1"/>
+              <a:t>based</a:t>
+            </a:r>
+            <a:r>
+              <a:rPr lang="fi-FI" dirty="0"/>
+              <a:t> on </a:t>
+            </a:r>
+            <a:r>
+              <a:rPr lang="fi-FI" dirty="0" err="1"/>
+              <a:t>predictions</a:t>
+            </a:r>
+            <a:r>
+              <a:rPr lang="fi-FI" dirty="0"/>
+              <a:t> </a:t>
+            </a:r>
+            <a:r>
+              <a:rPr lang="fi-FI" dirty="0" err="1"/>
+              <a:t>by</a:t>
+            </a:r>
+            <a:r>
+              <a:rPr lang="fi-FI" dirty="0"/>
+              <a:t> </a:t>
+            </a:r>
+            <a:r>
+              <a:rPr lang="fi-FI" dirty="0" err="1"/>
+              <a:t>the</a:t>
+            </a:r>
+            <a:r>
+              <a:rPr lang="fi-FI" dirty="0"/>
+              <a:t> </a:t>
             </a:r>
             <a:r>
               <a:rPr lang="fi-FI" dirty="0" err="1"/>

</xml_diff>